<commit_message>
Update Heart Failure Prediction - Ajit Kolekar.pptx
</commit_message>
<xml_diff>
--- a/Heart Failure Prediction - Ajit Kolekar.pptx
+++ b/Heart Failure Prediction - Ajit Kolekar.pptx
@@ -9547,10 +9547,10 @@
       </p:sp>
       <p:pic>
         <p:nvPicPr>
-          <p:cNvPr id="2050" name="Picture 2">
+          <p:cNvPr id="1026" name="Picture 2">
             <a:extLst>
               <a:ext uri="{FF2B5EF4-FFF2-40B4-BE49-F238E27FC236}">
-                <a16:creationId xmlns:a16="http://schemas.microsoft.com/office/drawing/2014/main" id="{0A28D440-79C1-4663-BA91-5BAE1C6AE822}"/>
+                <a16:creationId xmlns:a16="http://schemas.microsoft.com/office/drawing/2014/main" id="{84309204-2FE3-42C2-9277-D4051DA771FF}"/>
               </a:ext>
             </a:extLst>
           </p:cNvPr>
@@ -9576,8 +9576,8 @@
         </p:blipFill>
         <p:spPr bwMode="auto">
           <a:xfrm>
-            <a:off x="2589213" y="2685019"/>
-            <a:ext cx="4313237" cy="3012763"/>
+            <a:off x="2589213" y="2543579"/>
+            <a:ext cx="4313237" cy="2958292"/>
           </a:xfrm>
           <a:prstGeom prst="rect">
             <a:avLst/>
@@ -9655,10 +9655,10 @@
       </p:sp>
       <p:pic>
         <p:nvPicPr>
-          <p:cNvPr id="5122" name="Picture 2">
+          <p:cNvPr id="2050" name="Picture 2">
             <a:extLst>
               <a:ext uri="{FF2B5EF4-FFF2-40B4-BE49-F238E27FC236}">
-                <a16:creationId xmlns:a16="http://schemas.microsoft.com/office/drawing/2014/main" id="{22DE8070-64E2-4DA2-A630-E7D0C37805C9}"/>
+                <a16:creationId xmlns:a16="http://schemas.microsoft.com/office/drawing/2014/main" id="{B8C1F607-2115-4666-AE5E-008D68195125}"/>
               </a:ext>
             </a:extLst>
           </p:cNvPr>
@@ -9684,8 +9684,8 @@
         </p:blipFill>
         <p:spPr bwMode="auto">
           <a:xfrm>
-            <a:off x="3476668" y="2257022"/>
-            <a:ext cx="4903317" cy="3531405"/>
+            <a:off x="4027011" y="2358646"/>
+            <a:ext cx="4992237" cy="3328158"/>
           </a:xfrm>
           <a:prstGeom prst="rect">
             <a:avLst/>
@@ -9834,10 +9834,10 @@
       </p:sp>
       <p:pic>
         <p:nvPicPr>
-          <p:cNvPr id="3076" name="Picture 4">
+          <p:cNvPr id="3074" name="Picture 2">
             <a:extLst>
               <a:ext uri="{FF2B5EF4-FFF2-40B4-BE49-F238E27FC236}">
-                <a16:creationId xmlns:a16="http://schemas.microsoft.com/office/drawing/2014/main" id="{5C9EC86B-230D-4132-A891-0F67C694E30F}"/>
+                <a16:creationId xmlns:a16="http://schemas.microsoft.com/office/drawing/2014/main" id="{A7135B87-1969-4AB3-907B-FEC7BBA5E5F4}"/>
               </a:ext>
             </a:extLst>
           </p:cNvPr>
@@ -9863,8 +9863,8 @@
         </p:blipFill>
         <p:spPr bwMode="auto">
           <a:xfrm>
-            <a:off x="2589213" y="2493286"/>
-            <a:ext cx="4313237" cy="3058877"/>
+            <a:off x="2589213" y="2543579"/>
+            <a:ext cx="4313237" cy="2958292"/>
           </a:xfrm>
           <a:prstGeom prst="rect">
             <a:avLst/>
@@ -9950,10 +9950,10 @@
       </p:sp>
       <p:pic>
         <p:nvPicPr>
-          <p:cNvPr id="6148" name="Picture 4">
+          <p:cNvPr id="4098" name="Picture 2">
             <a:extLst>
               <a:ext uri="{FF2B5EF4-FFF2-40B4-BE49-F238E27FC236}">
-                <a16:creationId xmlns:a16="http://schemas.microsoft.com/office/drawing/2014/main" id="{A6E43FA5-8130-4F6A-8EC5-FF4607CE3810}"/>
+                <a16:creationId xmlns:a16="http://schemas.microsoft.com/office/drawing/2014/main" id="{E09AD873-2E70-4C5C-9E34-158D0760E5E5}"/>
               </a:ext>
             </a:extLst>
           </p:cNvPr>
@@ -9979,8 +9979,8 @@
         </p:blipFill>
         <p:spPr bwMode="auto">
           <a:xfrm>
-            <a:off x="3494421" y="2257022"/>
-            <a:ext cx="4903317" cy="3531405"/>
+            <a:off x="3930748" y="2377696"/>
+            <a:ext cx="4992237" cy="3328158"/>
           </a:xfrm>
           <a:prstGeom prst="rect">
             <a:avLst/>
@@ -10050,17 +10050,10 @@
           <a:p>
             <a:pPr algn="ctr"/>
             <a:r>
-              <a:rPr lang="en-US" dirty="0"/>
-              <a:t>‘</a:t>
-            </a:r>
-            <a:r>
-              <a:rPr lang="en-US" dirty="0" err="1"/>
-              <a:t>serum_creatinine</a:t>
-            </a:r>
-            <a:r>
-              <a:rPr lang="en-US" dirty="0"/>
-              <a:t>’ Variable Analysis</a:t>
-            </a:r>
+              <a:rPr lang="en-US"/>
+              <a:t>‘serum_creatinine’ Variable Analysis</a:t>
+            </a:r>
+            <a:endParaRPr lang="en-US" dirty="0"/>
           </a:p>
         </p:txBody>
       </p:sp>
@@ -10091,48 +10084,49 @@
           <a:lstStyle/>
           <a:p>
             <a:r>
-              <a:rPr lang="en-US" dirty="0"/>
+              <a:rPr lang="en-US"/>
               <a:t>Mean: 1.39</a:t>
             </a:r>
           </a:p>
           <a:p>
             <a:r>
-              <a:rPr lang="en-US" dirty="0"/>
+              <a:rPr lang="en-US"/>
               <a:t>Mode: 1.0</a:t>
             </a:r>
           </a:p>
           <a:p>
             <a:r>
-              <a:rPr lang="en-US" dirty="0"/>
+              <a:rPr lang="en-US"/>
               <a:t>Median: 1.1</a:t>
             </a:r>
           </a:p>
           <a:p>
             <a:r>
-              <a:rPr lang="en-US" dirty="0"/>
+              <a:rPr lang="en-US"/>
               <a:t>Outliers: 5.0, 5.8, 6.1, 6.8, 9.0, 9.4</a:t>
             </a:r>
           </a:p>
           <a:p>
             <a:r>
-              <a:rPr lang="en-US" dirty="0"/>
+              <a:rPr lang="en-US"/>
               <a:t>Range: 0.5 to 9.4</a:t>
             </a:r>
           </a:p>
           <a:p>
             <a:r>
-              <a:rPr lang="en-US" dirty="0"/>
+              <a:rPr lang="en-US"/>
               <a:t>Distribution looks to be skewed to the right with a long tail</a:t>
             </a:r>
+            <a:endParaRPr lang="en-US" dirty="0"/>
           </a:p>
         </p:txBody>
       </p:sp>
       <p:pic>
         <p:nvPicPr>
-          <p:cNvPr id="4100" name="Picture 4">
+          <p:cNvPr id="5122" name="Picture 2">
             <a:extLst>
               <a:ext uri="{FF2B5EF4-FFF2-40B4-BE49-F238E27FC236}">
-                <a16:creationId xmlns:a16="http://schemas.microsoft.com/office/drawing/2014/main" id="{6BA86808-DBE5-48EF-B08F-82E76E750248}"/>
+                <a16:creationId xmlns:a16="http://schemas.microsoft.com/office/drawing/2014/main" id="{E1063003-D79E-4B11-B105-41CE3858C0BF}"/>
               </a:ext>
             </a:extLst>
           </p:cNvPr>
@@ -10158,8 +10152,8 @@
         </p:blipFill>
         <p:spPr bwMode="auto">
           <a:xfrm>
-            <a:off x="2589213" y="2469512"/>
-            <a:ext cx="4313237" cy="3106425"/>
+            <a:off x="2589213" y="2543579"/>
+            <a:ext cx="4313237" cy="2958292"/>
           </a:xfrm>
           <a:prstGeom prst="rect">
             <a:avLst/>

</xml_diff>